<commit_message>
Correções slides e Scripts
</commit_message>
<xml_diff>
--- a/SlideApresentacao/TRIGGERS.pptx
+++ b/SlideApresentacao/TRIGGERS.pptx
@@ -5,10 +5,10 @@
     <p:sldMasterId id="2147483756" r:id="rId4"/>
   </p:sldMasterIdLst>
   <p:notesMasterIdLst>
-    <p:notesMasterId r:id="rId16"/>
+    <p:notesMasterId r:id="rId18"/>
   </p:notesMasterIdLst>
   <p:handoutMasterIdLst>
-    <p:handoutMasterId r:id="rId17"/>
+    <p:handoutMasterId r:id="rId19"/>
   </p:handoutMasterIdLst>
   <p:sldIdLst>
     <p:sldId id="267" r:id="rId5"/>
@@ -20,8 +20,10 @@
     <p:sldId id="288" r:id="rId11"/>
     <p:sldId id="289" r:id="rId12"/>
     <p:sldId id="290" r:id="rId13"/>
-    <p:sldId id="291" r:id="rId14"/>
-    <p:sldId id="283" r:id="rId15"/>
+    <p:sldId id="294" r:id="rId14"/>
+    <p:sldId id="291" r:id="rId15"/>
+    <p:sldId id="295" r:id="rId16"/>
+    <p:sldId id="283" r:id="rId17"/>
   </p:sldIdLst>
   <p:sldSz cx="12188825" cy="6858000"/>
   <p:notesSz cx="6858000" cy="9144000"/>
@@ -4911,6 +4913,895 @@
       </p:grpSpPr>
       <p:sp>
         <p:nvSpPr>
+          <p:cNvPr id="3" name="Espaço Reservado para Conteúdo 2">
+            <a:extLst>
+              <a:ext uri="{FF2B5EF4-FFF2-40B4-BE49-F238E27FC236}">
+                <a16:creationId xmlns:a16="http://schemas.microsoft.com/office/drawing/2014/main" id="{E66C749A-CDFC-42F9-92BE-7B8606F16302}"/>
+              </a:ext>
+            </a:extLst>
+          </p:cNvPr>
+          <p:cNvSpPr>
+            <a:spLocks noGrp="1"/>
+          </p:cNvSpPr>
+          <p:nvPr>
+            <p:ph idx="1"/>
+          </p:nvPr>
+        </p:nvSpPr>
+        <p:spPr>
+          <a:xfrm>
+            <a:off x="1218883" y="404664"/>
+            <a:ext cx="9751060" cy="5305896"/>
+          </a:xfrm>
+        </p:spPr>
+        <p:txBody>
+          <a:bodyPr>
+            <a:noAutofit/>
+          </a:bodyPr>
+          <a:lstStyle/>
+          <a:p>
+            <a:pPr marL="0" indent="0">
+              <a:lnSpc>
+                <a:spcPct val="120000"/>
+              </a:lnSpc>
+              <a:spcBef>
+                <a:spcPts val="0"/>
+              </a:spcBef>
+              <a:buNone/>
+            </a:pPr>
+            <a:r>
+              <a:rPr lang="en-US" sz="1200" dirty="0"/>
+              <a:t>CREATE OR REPLACE PROCEDURE </a:t>
+            </a:r>
+            <a:r>
+              <a:rPr lang="en-US" sz="1200" dirty="0" err="1"/>
+              <a:t>add_job_history</a:t>
+            </a:r>
+            <a:endParaRPr lang="en-US" sz="1200" dirty="0"/>
+          </a:p>
+          <a:p>
+            <a:pPr marL="0" indent="0">
+              <a:lnSpc>
+                <a:spcPct val="120000"/>
+              </a:lnSpc>
+              <a:spcBef>
+                <a:spcPts val="0"/>
+              </a:spcBef>
+              <a:buNone/>
+            </a:pPr>
+            <a:r>
+              <a:rPr lang="en-US" sz="1200" dirty="0"/>
+              <a:t>  (  </a:t>
+            </a:r>
+            <a:r>
+              <a:rPr lang="en-US" sz="1200" dirty="0" err="1"/>
+              <a:t>p_emp_id</a:t>
+            </a:r>
+            <a:r>
+              <a:rPr lang="en-US" sz="1200" dirty="0"/>
+              <a:t>          </a:t>
+            </a:r>
+            <a:r>
+              <a:rPr lang="en-US" sz="1200" dirty="0" err="1"/>
+              <a:t>job_history.employee_id%type</a:t>
+            </a:r>
+            <a:endParaRPr lang="en-US" sz="1200" dirty="0"/>
+          </a:p>
+          <a:p>
+            <a:pPr marL="0" indent="0">
+              <a:lnSpc>
+                <a:spcPct val="120000"/>
+              </a:lnSpc>
+              <a:spcBef>
+                <a:spcPts val="0"/>
+              </a:spcBef>
+              <a:buNone/>
+            </a:pPr>
+            <a:r>
+              <a:rPr lang="en-US" sz="1200" dirty="0"/>
+              <a:t>   , </a:t>
+            </a:r>
+            <a:r>
+              <a:rPr lang="en-US" sz="1200" dirty="0" err="1"/>
+              <a:t>p_start_date</a:t>
+            </a:r>
+            <a:r>
+              <a:rPr lang="en-US" sz="1200" dirty="0"/>
+              <a:t>      </a:t>
+            </a:r>
+            <a:r>
+              <a:rPr lang="en-US" sz="1200" dirty="0" err="1"/>
+              <a:t>job_history.start_date%type</a:t>
+            </a:r>
+            <a:endParaRPr lang="en-US" sz="1200" dirty="0"/>
+          </a:p>
+          <a:p>
+            <a:pPr marL="0" indent="0">
+              <a:lnSpc>
+                <a:spcPct val="120000"/>
+              </a:lnSpc>
+              <a:spcBef>
+                <a:spcPts val="0"/>
+              </a:spcBef>
+              <a:buNone/>
+            </a:pPr>
+            <a:r>
+              <a:rPr lang="en-US" sz="1200" dirty="0"/>
+              <a:t>   , </a:t>
+            </a:r>
+            <a:r>
+              <a:rPr lang="en-US" sz="1200" dirty="0" err="1"/>
+              <a:t>p_end_date</a:t>
+            </a:r>
+            <a:r>
+              <a:rPr lang="en-US" sz="1200" dirty="0"/>
+              <a:t>        </a:t>
+            </a:r>
+            <a:r>
+              <a:rPr lang="en-US" sz="1200" dirty="0" err="1"/>
+              <a:t>job_history.end_date%type</a:t>
+            </a:r>
+            <a:endParaRPr lang="en-US" sz="1200" dirty="0"/>
+          </a:p>
+          <a:p>
+            <a:pPr marL="0" indent="0">
+              <a:lnSpc>
+                <a:spcPct val="120000"/>
+              </a:lnSpc>
+              <a:spcBef>
+                <a:spcPts val="0"/>
+              </a:spcBef>
+              <a:buNone/>
+            </a:pPr>
+            <a:r>
+              <a:rPr lang="en-US" sz="1200" dirty="0"/>
+              <a:t>   , </a:t>
+            </a:r>
+            <a:r>
+              <a:rPr lang="en-US" sz="1200" dirty="0" err="1"/>
+              <a:t>p_job_id</a:t>
+            </a:r>
+            <a:r>
+              <a:rPr lang="en-US" sz="1200" dirty="0"/>
+              <a:t>          </a:t>
+            </a:r>
+            <a:r>
+              <a:rPr lang="en-US" sz="1200" dirty="0" err="1"/>
+              <a:t>job_history.job_id%type</a:t>
+            </a:r>
+            <a:endParaRPr lang="en-US" sz="1200" dirty="0"/>
+          </a:p>
+          <a:p>
+            <a:pPr marL="0" indent="0">
+              <a:lnSpc>
+                <a:spcPct val="120000"/>
+              </a:lnSpc>
+              <a:spcBef>
+                <a:spcPts val="0"/>
+              </a:spcBef>
+              <a:buNone/>
+            </a:pPr>
+            <a:r>
+              <a:rPr lang="en-US" sz="1200" dirty="0"/>
+              <a:t>   , </a:t>
+            </a:r>
+            <a:r>
+              <a:rPr lang="en-US" sz="1200" dirty="0" err="1"/>
+              <a:t>p_new_job_id</a:t>
+            </a:r>
+            <a:r>
+              <a:rPr lang="en-US" sz="1200" dirty="0"/>
+              <a:t>       </a:t>
+            </a:r>
+            <a:r>
+              <a:rPr lang="en-US" sz="1200" dirty="0" err="1"/>
+              <a:t>job_history.new_job_id%type</a:t>
+            </a:r>
+            <a:endParaRPr lang="en-US" sz="1200" dirty="0"/>
+          </a:p>
+          <a:p>
+            <a:pPr marL="0" indent="0">
+              <a:lnSpc>
+                <a:spcPct val="120000"/>
+              </a:lnSpc>
+              <a:spcBef>
+                <a:spcPts val="0"/>
+              </a:spcBef>
+              <a:buNone/>
+            </a:pPr>
+            <a:r>
+              <a:rPr lang="en-US" sz="1200" dirty="0"/>
+              <a:t>   , </a:t>
+            </a:r>
+            <a:r>
+              <a:rPr lang="en-US" sz="1200" dirty="0" err="1"/>
+              <a:t>p_department_id</a:t>
+            </a:r>
+            <a:r>
+              <a:rPr lang="en-US" sz="1200" dirty="0"/>
+              <a:t>   </a:t>
+            </a:r>
+            <a:r>
+              <a:rPr lang="en-US" sz="1200" dirty="0" err="1"/>
+              <a:t>job_history.department_id%type</a:t>
+            </a:r>
+            <a:endParaRPr lang="en-US" sz="1200" dirty="0"/>
+          </a:p>
+          <a:p>
+            <a:pPr marL="0" indent="0">
+              <a:lnSpc>
+                <a:spcPct val="120000"/>
+              </a:lnSpc>
+              <a:spcBef>
+                <a:spcPts val="0"/>
+              </a:spcBef>
+              <a:buNone/>
+            </a:pPr>
+            <a:r>
+              <a:rPr lang="en-US" sz="1200" dirty="0"/>
+              <a:t>   , </a:t>
+            </a:r>
+            <a:r>
+              <a:rPr lang="en-US" sz="1200" dirty="0" err="1"/>
+              <a:t>p_new_department_id</a:t>
+            </a:r>
+            <a:r>
+              <a:rPr lang="en-US" sz="1200" dirty="0"/>
+              <a:t> </a:t>
+            </a:r>
+            <a:r>
+              <a:rPr lang="en-US" sz="1200" dirty="0" err="1"/>
+              <a:t>job_history.new_department_id%type</a:t>
+            </a:r>
+            <a:endParaRPr lang="en-US" sz="1200" dirty="0"/>
+          </a:p>
+          <a:p>
+            <a:pPr marL="0" indent="0">
+              <a:lnSpc>
+                <a:spcPct val="120000"/>
+              </a:lnSpc>
+              <a:spcBef>
+                <a:spcPts val="0"/>
+              </a:spcBef>
+              <a:buNone/>
+            </a:pPr>
+            <a:r>
+              <a:rPr lang="en-US" sz="1200" dirty="0"/>
+              <a:t>   , </a:t>
+            </a:r>
+            <a:r>
+              <a:rPr lang="en-US" sz="1200" dirty="0" err="1"/>
+              <a:t>p_new_salary</a:t>
+            </a:r>
+            <a:r>
+              <a:rPr lang="en-US" sz="1200" dirty="0"/>
+              <a:t> </a:t>
+            </a:r>
+            <a:r>
+              <a:rPr lang="en-US" sz="1200" dirty="0" err="1"/>
+              <a:t>job_history.sal_new%type</a:t>
+            </a:r>
+            <a:endParaRPr lang="en-US" sz="1200" dirty="0"/>
+          </a:p>
+          <a:p>
+            <a:pPr marL="0" indent="0">
+              <a:lnSpc>
+                <a:spcPct val="120000"/>
+              </a:lnSpc>
+              <a:spcBef>
+                <a:spcPts val="0"/>
+              </a:spcBef>
+              <a:buNone/>
+            </a:pPr>
+            <a:r>
+              <a:rPr lang="en-US" sz="1200" dirty="0"/>
+              <a:t>   , </a:t>
+            </a:r>
+            <a:r>
+              <a:rPr lang="en-US" sz="1200" dirty="0" err="1"/>
+              <a:t>p_old_salary</a:t>
+            </a:r>
+            <a:r>
+              <a:rPr lang="en-US" sz="1200" dirty="0"/>
+              <a:t> </a:t>
+            </a:r>
+            <a:r>
+              <a:rPr lang="en-US" sz="1200" dirty="0" err="1"/>
+              <a:t>job_history.sal_old%type</a:t>
+            </a:r>
+            <a:endParaRPr lang="en-US" sz="1200" dirty="0"/>
+          </a:p>
+          <a:p>
+            <a:pPr marL="0" indent="0">
+              <a:lnSpc>
+                <a:spcPct val="120000"/>
+              </a:lnSpc>
+              <a:spcBef>
+                <a:spcPts val="0"/>
+              </a:spcBef>
+              <a:buNone/>
+            </a:pPr>
+            <a:r>
+              <a:rPr lang="en-US" sz="1200" dirty="0"/>
+              <a:t>   )</a:t>
+            </a:r>
+          </a:p>
+          <a:p>
+            <a:pPr marL="0" indent="0">
+              <a:lnSpc>
+                <a:spcPct val="120000"/>
+              </a:lnSpc>
+              <a:spcBef>
+                <a:spcPts val="0"/>
+              </a:spcBef>
+              <a:buNone/>
+            </a:pPr>
+            <a:r>
+              <a:rPr lang="en-US" sz="1200" dirty="0"/>
+              <a:t>IS</a:t>
+            </a:r>
+          </a:p>
+          <a:p>
+            <a:pPr marL="0" indent="0">
+              <a:lnSpc>
+                <a:spcPct val="120000"/>
+              </a:lnSpc>
+              <a:spcBef>
+                <a:spcPts val="0"/>
+              </a:spcBef>
+              <a:buNone/>
+            </a:pPr>
+            <a:r>
+              <a:rPr lang="en-US" sz="1200" dirty="0"/>
+              <a:t>BEGIN</a:t>
+            </a:r>
+          </a:p>
+          <a:p>
+            <a:pPr marL="0" indent="0">
+              <a:lnSpc>
+                <a:spcPct val="120000"/>
+              </a:lnSpc>
+              <a:spcBef>
+                <a:spcPts val="0"/>
+              </a:spcBef>
+              <a:buNone/>
+            </a:pPr>
+            <a:r>
+              <a:rPr lang="en-US" sz="1200" dirty="0"/>
+              <a:t>  INSERT INTO </a:t>
+            </a:r>
+            <a:r>
+              <a:rPr lang="en-US" sz="1200" dirty="0" err="1"/>
+              <a:t>job_history</a:t>
+            </a:r>
+            <a:r>
+              <a:rPr lang="en-US" sz="1200" dirty="0"/>
+              <a:t> (</a:t>
+            </a:r>
+            <a:r>
+              <a:rPr lang="en-US" sz="1200" dirty="0" err="1"/>
+              <a:t>employee_id</a:t>
+            </a:r>
+            <a:r>
+              <a:rPr lang="en-US" sz="1200" dirty="0"/>
+              <a:t>, </a:t>
+            </a:r>
+            <a:r>
+              <a:rPr lang="en-US" sz="1200" dirty="0" err="1"/>
+              <a:t>start_date</a:t>
+            </a:r>
+            <a:r>
+              <a:rPr lang="en-US" sz="1200" dirty="0"/>
+              <a:t>, </a:t>
+            </a:r>
+            <a:r>
+              <a:rPr lang="en-US" sz="1200" dirty="0" err="1"/>
+              <a:t>end_date</a:t>
+            </a:r>
+            <a:r>
+              <a:rPr lang="en-US" sz="1200" dirty="0"/>
+              <a:t>,</a:t>
+            </a:r>
+          </a:p>
+          <a:p>
+            <a:pPr marL="0" indent="0">
+              <a:lnSpc>
+                <a:spcPct val="120000"/>
+              </a:lnSpc>
+              <a:spcBef>
+                <a:spcPts val="0"/>
+              </a:spcBef>
+              <a:buNone/>
+            </a:pPr>
+            <a:r>
+              <a:rPr lang="en-US" sz="1200" dirty="0"/>
+              <a:t>                           </a:t>
+            </a:r>
+            <a:r>
+              <a:rPr lang="en-US" sz="1200" dirty="0" err="1"/>
+              <a:t>job_id</a:t>
+            </a:r>
+            <a:r>
+              <a:rPr lang="en-US" sz="1200" dirty="0"/>
+              <a:t>, </a:t>
+            </a:r>
+            <a:r>
+              <a:rPr lang="en-US" sz="1200" dirty="0" err="1"/>
+              <a:t>department_id</a:t>
+            </a:r>
+            <a:r>
+              <a:rPr lang="en-US" sz="1200" dirty="0"/>
+              <a:t>, </a:t>
+            </a:r>
+            <a:r>
+              <a:rPr lang="en-US" sz="1200" dirty="0" err="1"/>
+              <a:t>new_department_id</a:t>
+            </a:r>
+            <a:r>
+              <a:rPr lang="en-US" sz="1200" dirty="0"/>
+              <a:t>, </a:t>
+            </a:r>
+          </a:p>
+          <a:p>
+            <a:pPr marL="0" indent="0">
+              <a:lnSpc>
+                <a:spcPct val="120000"/>
+              </a:lnSpc>
+              <a:spcBef>
+                <a:spcPts val="0"/>
+              </a:spcBef>
+              <a:buNone/>
+            </a:pPr>
+            <a:r>
+              <a:rPr lang="en-US" sz="1200" dirty="0"/>
+              <a:t>                           </a:t>
+            </a:r>
+            <a:r>
+              <a:rPr lang="en-US" sz="1200" dirty="0" err="1"/>
+              <a:t>sal_new</a:t>
+            </a:r>
+            <a:r>
+              <a:rPr lang="en-US" sz="1200" dirty="0"/>
+              <a:t>, </a:t>
+            </a:r>
+            <a:r>
+              <a:rPr lang="en-US" sz="1200" dirty="0" err="1"/>
+              <a:t>sal_old</a:t>
+            </a:r>
+            <a:r>
+              <a:rPr lang="en-US" sz="1200" dirty="0"/>
+              <a:t>, </a:t>
+            </a:r>
+            <a:r>
+              <a:rPr lang="en-US" sz="1200" dirty="0" err="1"/>
+              <a:t>new_job_id</a:t>
+            </a:r>
+            <a:r>
+              <a:rPr lang="en-US" sz="1200" dirty="0"/>
+              <a:t>)</a:t>
+            </a:r>
+          </a:p>
+          <a:p>
+            <a:pPr marL="0" indent="0">
+              <a:lnSpc>
+                <a:spcPct val="120000"/>
+              </a:lnSpc>
+              <a:spcBef>
+                <a:spcPts val="0"/>
+              </a:spcBef>
+              <a:buNone/>
+            </a:pPr>
+            <a:r>
+              <a:rPr lang="en-US" sz="1200" dirty="0"/>
+              <a:t>    VALUES(</a:t>
+            </a:r>
+            <a:r>
+              <a:rPr lang="en-US" sz="1200" dirty="0" err="1"/>
+              <a:t>p_emp_id</a:t>
+            </a:r>
+            <a:r>
+              <a:rPr lang="en-US" sz="1200" dirty="0"/>
+              <a:t>, </a:t>
+            </a:r>
+            <a:r>
+              <a:rPr lang="en-US" sz="1200" dirty="0" err="1"/>
+              <a:t>p_start_date</a:t>
+            </a:r>
+            <a:r>
+              <a:rPr lang="en-US" sz="1200" dirty="0"/>
+              <a:t>, </a:t>
+            </a:r>
+            <a:r>
+              <a:rPr lang="en-US" sz="1200" dirty="0" err="1"/>
+              <a:t>p_end_date</a:t>
+            </a:r>
+            <a:r>
+              <a:rPr lang="en-US" sz="1200" dirty="0"/>
+              <a:t>, </a:t>
+            </a:r>
+            <a:r>
+              <a:rPr lang="en-US" sz="1200" dirty="0" err="1"/>
+              <a:t>p_job_id</a:t>
+            </a:r>
+            <a:r>
+              <a:rPr lang="en-US" sz="1200" dirty="0"/>
+              <a:t>, </a:t>
+            </a:r>
+            <a:r>
+              <a:rPr lang="en-US" sz="1200" dirty="0" err="1"/>
+              <a:t>p_department_id</a:t>
+            </a:r>
+            <a:r>
+              <a:rPr lang="en-US" sz="1200" dirty="0"/>
+              <a:t>, </a:t>
+            </a:r>
+          </a:p>
+          <a:p>
+            <a:pPr marL="0" indent="0">
+              <a:lnSpc>
+                <a:spcPct val="120000"/>
+              </a:lnSpc>
+              <a:spcBef>
+                <a:spcPts val="0"/>
+              </a:spcBef>
+              <a:buNone/>
+            </a:pPr>
+            <a:r>
+              <a:rPr lang="en-US" sz="1200" dirty="0"/>
+              <a:t>    </a:t>
+            </a:r>
+            <a:r>
+              <a:rPr lang="en-US" sz="1200" dirty="0" err="1"/>
+              <a:t>p_new_department_id</a:t>
+            </a:r>
+            <a:r>
+              <a:rPr lang="en-US" sz="1200" dirty="0"/>
+              <a:t>, </a:t>
+            </a:r>
+            <a:r>
+              <a:rPr lang="en-US" sz="1200" dirty="0" err="1"/>
+              <a:t>p_new_salary</a:t>
+            </a:r>
+            <a:r>
+              <a:rPr lang="en-US" sz="1200" dirty="0"/>
+              <a:t>, </a:t>
+            </a:r>
+            <a:r>
+              <a:rPr lang="en-US" sz="1200" dirty="0" err="1"/>
+              <a:t>p_old_salary</a:t>
+            </a:r>
+            <a:r>
+              <a:rPr lang="en-US" sz="1200" dirty="0"/>
+              <a:t>, </a:t>
+            </a:r>
+            <a:r>
+              <a:rPr lang="en-US" sz="1200" dirty="0" err="1"/>
+              <a:t>p_new_job_id</a:t>
+            </a:r>
+            <a:r>
+              <a:rPr lang="en-US" sz="1200" dirty="0"/>
+              <a:t>);</a:t>
+            </a:r>
+          </a:p>
+          <a:p>
+            <a:pPr marL="0" indent="0">
+              <a:lnSpc>
+                <a:spcPct val="120000"/>
+              </a:lnSpc>
+              <a:spcBef>
+                <a:spcPts val="0"/>
+              </a:spcBef>
+              <a:buNone/>
+            </a:pPr>
+            <a:r>
+              <a:rPr lang="en-US" sz="1200" dirty="0"/>
+              <a:t>EXCEPTION</a:t>
+            </a:r>
+          </a:p>
+          <a:p>
+            <a:pPr marL="0" indent="0">
+              <a:lnSpc>
+                <a:spcPct val="120000"/>
+              </a:lnSpc>
+              <a:spcBef>
+                <a:spcPts val="0"/>
+              </a:spcBef>
+              <a:buNone/>
+            </a:pPr>
+            <a:r>
+              <a:rPr lang="en-US" sz="1200" dirty="0"/>
+              <a:t>    WHEN DUP_VAL_ON_INDEX THEN</a:t>
+            </a:r>
+          </a:p>
+          <a:p>
+            <a:pPr marL="0" indent="0">
+              <a:lnSpc>
+                <a:spcPct val="120000"/>
+              </a:lnSpc>
+              <a:spcBef>
+                <a:spcPts val="0"/>
+              </a:spcBef>
+              <a:buNone/>
+            </a:pPr>
+            <a:r>
+              <a:rPr lang="en-US" sz="1200" dirty="0"/>
+              <a:t>        UPDATE </a:t>
+            </a:r>
+            <a:r>
+              <a:rPr lang="en-US" sz="1200" dirty="0" err="1"/>
+              <a:t>job_history</a:t>
+            </a:r>
+            <a:endParaRPr lang="en-US" sz="1200" dirty="0"/>
+          </a:p>
+          <a:p>
+            <a:pPr marL="0" indent="0">
+              <a:lnSpc>
+                <a:spcPct val="120000"/>
+              </a:lnSpc>
+              <a:spcBef>
+                <a:spcPts val="0"/>
+              </a:spcBef>
+              <a:buNone/>
+            </a:pPr>
+            <a:r>
+              <a:rPr lang="en-US" sz="1200" dirty="0"/>
+              <a:t>        SET </a:t>
+            </a:r>
+            <a:r>
+              <a:rPr lang="en-US" sz="1200" dirty="0" err="1"/>
+              <a:t>end_date</a:t>
+            </a:r>
+            <a:r>
+              <a:rPr lang="en-US" sz="1200" dirty="0"/>
+              <a:t>=</a:t>
+            </a:r>
+            <a:r>
+              <a:rPr lang="en-US" sz="1200" dirty="0" err="1"/>
+              <a:t>p_end_date</a:t>
+            </a:r>
+            <a:r>
+              <a:rPr lang="en-US" sz="1200" dirty="0"/>
+              <a:t>, </a:t>
+            </a:r>
+            <a:r>
+              <a:rPr lang="en-US" sz="1200" dirty="0" err="1"/>
+              <a:t>department_id</a:t>
+            </a:r>
+            <a:r>
+              <a:rPr lang="en-US" sz="1200" dirty="0"/>
+              <a:t>=</a:t>
+            </a:r>
+            <a:r>
+              <a:rPr lang="en-US" sz="1200" dirty="0" err="1"/>
+              <a:t>p_department_id</a:t>
+            </a:r>
+            <a:r>
+              <a:rPr lang="en-US" sz="1200" dirty="0"/>
+              <a:t>, </a:t>
+            </a:r>
+          </a:p>
+          <a:p>
+            <a:pPr marL="0" indent="0">
+              <a:lnSpc>
+                <a:spcPct val="120000"/>
+              </a:lnSpc>
+              <a:spcBef>
+                <a:spcPts val="0"/>
+              </a:spcBef>
+              <a:buNone/>
+            </a:pPr>
+            <a:r>
+              <a:rPr lang="en-US" sz="1200" dirty="0"/>
+              <a:t>            </a:t>
+            </a:r>
+            <a:r>
+              <a:rPr lang="en-US" sz="1200" dirty="0" err="1"/>
+              <a:t>new_department_id</a:t>
+            </a:r>
+            <a:r>
+              <a:rPr lang="en-US" sz="1200" dirty="0"/>
+              <a:t>=</a:t>
+            </a:r>
+            <a:r>
+              <a:rPr lang="en-US" sz="1200" dirty="0" err="1"/>
+              <a:t>p_new_department_id</a:t>
+            </a:r>
+            <a:r>
+              <a:rPr lang="en-US" sz="1200" dirty="0"/>
+              <a:t>,</a:t>
+            </a:r>
+          </a:p>
+          <a:p>
+            <a:pPr marL="0" indent="0">
+              <a:lnSpc>
+                <a:spcPct val="120000"/>
+              </a:lnSpc>
+              <a:spcBef>
+                <a:spcPts val="0"/>
+              </a:spcBef>
+              <a:buNone/>
+            </a:pPr>
+            <a:r>
+              <a:rPr lang="en-US" sz="1200" dirty="0"/>
+              <a:t>            </a:t>
+            </a:r>
+            <a:r>
+              <a:rPr lang="en-US" sz="1200" dirty="0" err="1"/>
+              <a:t>job_id</a:t>
+            </a:r>
+            <a:r>
+              <a:rPr lang="en-US" sz="1200" dirty="0"/>
+              <a:t>=</a:t>
+            </a:r>
+            <a:r>
+              <a:rPr lang="en-US" sz="1200" dirty="0" err="1"/>
+              <a:t>p_job_id</a:t>
+            </a:r>
+            <a:r>
+              <a:rPr lang="en-US" sz="1200" dirty="0"/>
+              <a:t>, </a:t>
+            </a:r>
+            <a:r>
+              <a:rPr lang="en-US" sz="1200" dirty="0" err="1"/>
+              <a:t>new_job_id</a:t>
+            </a:r>
+            <a:r>
+              <a:rPr lang="en-US" sz="1200" dirty="0"/>
+              <a:t>=</a:t>
+            </a:r>
+            <a:r>
+              <a:rPr lang="en-US" sz="1200" dirty="0" err="1"/>
+              <a:t>p_new_job_id</a:t>
+            </a:r>
+            <a:r>
+              <a:rPr lang="en-US" sz="1200" dirty="0"/>
+              <a:t>,</a:t>
+            </a:r>
+          </a:p>
+          <a:p>
+            <a:pPr marL="0" indent="0">
+              <a:lnSpc>
+                <a:spcPct val="120000"/>
+              </a:lnSpc>
+              <a:spcBef>
+                <a:spcPts val="0"/>
+              </a:spcBef>
+              <a:buNone/>
+            </a:pPr>
+            <a:r>
+              <a:rPr lang="en-US" sz="1200" dirty="0"/>
+              <a:t>            </a:t>
+            </a:r>
+            <a:r>
+              <a:rPr lang="en-US" sz="1200" dirty="0" err="1"/>
+              <a:t>sal_old</a:t>
+            </a:r>
+            <a:r>
+              <a:rPr lang="en-US" sz="1200" dirty="0"/>
+              <a:t>=</a:t>
+            </a:r>
+            <a:r>
+              <a:rPr lang="en-US" sz="1200" dirty="0" err="1"/>
+              <a:t>p_old_salary</a:t>
+            </a:r>
+            <a:r>
+              <a:rPr lang="en-US" sz="1200" dirty="0"/>
+              <a:t>, </a:t>
+            </a:r>
+            <a:r>
+              <a:rPr lang="en-US" sz="1200" dirty="0" err="1"/>
+              <a:t>sal_new</a:t>
+            </a:r>
+            <a:r>
+              <a:rPr lang="en-US" sz="1200" dirty="0"/>
+              <a:t>=</a:t>
+            </a:r>
+            <a:r>
+              <a:rPr lang="en-US" sz="1200" dirty="0" err="1"/>
+              <a:t>p_new_salary</a:t>
+            </a:r>
+            <a:endParaRPr lang="en-US" sz="1200" dirty="0"/>
+          </a:p>
+          <a:p>
+            <a:pPr marL="0" indent="0">
+              <a:lnSpc>
+                <a:spcPct val="120000"/>
+              </a:lnSpc>
+              <a:spcBef>
+                <a:spcPts val="0"/>
+              </a:spcBef>
+              <a:buNone/>
+            </a:pPr>
+            <a:r>
+              <a:rPr lang="en-US" sz="1200" dirty="0"/>
+              <a:t>        WHERE </a:t>
+            </a:r>
+            <a:r>
+              <a:rPr lang="en-US" sz="1200" dirty="0" err="1"/>
+              <a:t>employee_id</a:t>
+            </a:r>
+            <a:r>
+              <a:rPr lang="en-US" sz="1200" dirty="0"/>
+              <a:t>=</a:t>
+            </a:r>
+            <a:r>
+              <a:rPr lang="en-US" sz="1200" dirty="0" err="1"/>
+              <a:t>p_emp_id</a:t>
+            </a:r>
+            <a:r>
+              <a:rPr lang="en-US" sz="1200" dirty="0"/>
+              <a:t>;</a:t>
+            </a:r>
+          </a:p>
+          <a:p>
+            <a:pPr marL="0" indent="0">
+              <a:lnSpc>
+                <a:spcPct val="120000"/>
+              </a:lnSpc>
+              <a:spcBef>
+                <a:spcPts val="0"/>
+              </a:spcBef>
+              <a:buNone/>
+            </a:pPr>
+            <a:r>
+              <a:rPr lang="en-US" sz="1200" dirty="0"/>
+              <a:t>END </a:t>
+            </a:r>
+            <a:r>
+              <a:rPr lang="en-US" sz="1200" dirty="0" err="1"/>
+              <a:t>add_job_history</a:t>
+            </a:r>
+            <a:r>
+              <a:rPr lang="en-US" sz="1200" dirty="0"/>
+              <a:t>;</a:t>
+            </a:r>
+            <a:endParaRPr lang="pt-BR" sz="1200" dirty="0"/>
+          </a:p>
+        </p:txBody>
+      </p:sp>
+    </p:spTree>
+    <p:extLst>
+      <p:ext uri="{BB962C8B-B14F-4D97-AF65-F5344CB8AC3E}">
+        <p14:creationId xmlns:p14="http://schemas.microsoft.com/office/powerpoint/2010/main" val="3758407012"/>
+      </p:ext>
+    </p:extLst>
+  </p:cSld>
+  <p:clrMapOvr>
+    <a:masterClrMapping/>
+  </p:clrMapOvr>
+  <mc:AlternateContent xmlns:mc="http://schemas.openxmlformats.org/markup-compatibility/2006" xmlns:p14="http://schemas.microsoft.com/office/powerpoint/2010/main">
+    <mc:Choice Requires="p14">
+      <p:transition spd="med" p14:dur="700">
+        <p:fade/>
+      </p:transition>
+    </mc:Choice>
+    <mc:Fallback xmlns="">
+      <p:transition spd="med">
+        <p:fade/>
+      </p:transition>
+    </mc:Fallback>
+  </mc:AlternateContent>
+</p:sld>
+</file>
+
+<file path=ppt/slides/slide11.xml><?xml version="1.0" encoding="utf-8"?>
+<p:sld xmlns:a="http://schemas.openxmlformats.org/drawingml/2006/main" xmlns:r="http://schemas.openxmlformats.org/officeDocument/2006/relationships" xmlns:p="http://schemas.openxmlformats.org/presentationml/2006/main">
+  <p:cSld>
+    <p:spTree>
+      <p:nvGrpSpPr>
+        <p:cNvPr id="1" name=""/>
+        <p:cNvGrpSpPr/>
+        <p:nvPr/>
+      </p:nvGrpSpPr>
+      <p:grpSpPr>
+        <a:xfrm>
+          <a:off x="0" y="0"/>
+          <a:ext cx="0" cy="0"/>
+          <a:chOff x="0" y="0"/>
+          <a:chExt cx="0" cy="0"/>
+        </a:xfrm>
+      </p:grpSpPr>
+      <p:sp>
+        <p:nvSpPr>
           <p:cNvPr id="2" name="Título 1">
             <a:extLst>
               <a:ext uri="{FF2B5EF4-FFF2-40B4-BE49-F238E27FC236}">
@@ -5013,6 +5904,395 @@
   <p:clrMapOvr>
     <a:masterClrMapping/>
   </p:clrMapOvr>
+  <mc:AlternateContent xmlns:mc="http://schemas.openxmlformats.org/markup-compatibility/2006" xmlns:p14="http://schemas.microsoft.com/office/powerpoint/2010/main">
+    <mc:Choice Requires="p14">
+      <p:transition spd="med" p14:dur="700">
+        <p:fade/>
+      </p:transition>
+    </mc:Choice>
+    <mc:Fallback xmlns="">
+      <p:transition spd="med">
+        <p:fade/>
+      </p:transition>
+    </mc:Fallback>
+  </mc:AlternateContent>
+</p:sld>
+</file>
+
+<file path=ppt/slides/slide12.xml><?xml version="1.0" encoding="utf-8"?>
+<p:sld xmlns:a="http://schemas.openxmlformats.org/drawingml/2006/main" xmlns:r="http://schemas.openxmlformats.org/officeDocument/2006/relationships" xmlns:p="http://schemas.openxmlformats.org/presentationml/2006/main">
+  <p:cSld>
+    <p:spTree>
+      <p:nvGrpSpPr>
+        <p:cNvPr id="1" name=""/>
+        <p:cNvGrpSpPr/>
+        <p:nvPr/>
+      </p:nvGrpSpPr>
+      <p:grpSpPr>
+        <a:xfrm>
+          <a:off x="0" y="0"/>
+          <a:ext cx="0" cy="0"/>
+          <a:chOff x="0" y="0"/>
+          <a:chExt cx="0" cy="0"/>
+        </a:xfrm>
+      </p:grpSpPr>
+      <p:sp>
+        <p:nvSpPr>
+          <p:cNvPr id="2" name="Título 1">
+            <a:extLst>
+              <a:ext uri="{FF2B5EF4-FFF2-40B4-BE49-F238E27FC236}">
+                <a16:creationId xmlns:a16="http://schemas.microsoft.com/office/drawing/2014/main" id="{35E74264-AAF4-4343-A5CF-B33FE8C479F4}"/>
+              </a:ext>
+            </a:extLst>
+          </p:cNvPr>
+          <p:cNvSpPr>
+            <a:spLocks noGrp="1"/>
+          </p:cNvSpPr>
+          <p:nvPr>
+            <p:ph type="title"/>
+          </p:nvPr>
+        </p:nvSpPr>
+        <p:spPr/>
+        <p:txBody>
+          <a:bodyPr/>
+          <a:lstStyle/>
+          <a:p>
+            <a:r>
+              <a:rPr lang="pt-BR" dirty="0"/>
+              <a:t>Terceiro Passo – Atualização do Trigger</a:t>
+            </a:r>
+          </a:p>
+        </p:txBody>
+      </p:sp>
+      <p:sp>
+        <p:nvSpPr>
+          <p:cNvPr id="3" name="Espaço Reservado para Conteúdo 2">
+            <a:extLst>
+              <a:ext uri="{FF2B5EF4-FFF2-40B4-BE49-F238E27FC236}">
+                <a16:creationId xmlns:a16="http://schemas.microsoft.com/office/drawing/2014/main" id="{839A45D3-AE46-4B7B-B698-A144A6BB160A}"/>
+              </a:ext>
+            </a:extLst>
+          </p:cNvPr>
+          <p:cNvSpPr>
+            <a:spLocks noGrp="1"/>
+          </p:cNvSpPr>
+          <p:nvPr>
+            <p:ph idx="1"/>
+          </p:nvPr>
+        </p:nvSpPr>
+        <p:spPr/>
+        <p:txBody>
+          <a:bodyPr>
+            <a:normAutofit fontScale="92500" lnSpcReduction="20000"/>
+          </a:bodyPr>
+          <a:lstStyle/>
+          <a:p>
+            <a:pPr marL="0" indent="0">
+              <a:lnSpc>
+                <a:spcPct val="120000"/>
+              </a:lnSpc>
+              <a:spcBef>
+                <a:spcPts val="0"/>
+              </a:spcBef>
+              <a:buNone/>
+            </a:pPr>
+            <a:r>
+              <a:rPr lang="pt-BR" dirty="0"/>
+              <a:t>CRATE OR REPLACE TRIGGER </a:t>
+            </a:r>
+            <a:r>
+              <a:rPr lang="pt-BR" dirty="0" err="1"/>
+              <a:t>update_job_history</a:t>
+            </a:r>
+            <a:endParaRPr lang="pt-BR" dirty="0"/>
+          </a:p>
+          <a:p>
+            <a:pPr marL="0" indent="0">
+              <a:lnSpc>
+                <a:spcPct val="120000"/>
+              </a:lnSpc>
+              <a:spcBef>
+                <a:spcPts val="0"/>
+              </a:spcBef>
+              <a:buNone/>
+            </a:pPr>
+            <a:r>
+              <a:rPr lang="pt-BR" dirty="0"/>
+              <a:t>  AFTER UPDATE OF </a:t>
+            </a:r>
+            <a:r>
+              <a:rPr lang="pt-BR" dirty="0" err="1"/>
+              <a:t>job_id</a:t>
+            </a:r>
+            <a:r>
+              <a:rPr lang="pt-BR" dirty="0"/>
+              <a:t>, </a:t>
+            </a:r>
+            <a:r>
+              <a:rPr lang="pt-BR" dirty="0" err="1"/>
+              <a:t>department_id</a:t>
+            </a:r>
+            <a:r>
+              <a:rPr lang="pt-BR" dirty="0"/>
+              <a:t> ON </a:t>
+            </a:r>
+            <a:r>
+              <a:rPr lang="pt-BR" dirty="0" err="1"/>
+              <a:t>employees</a:t>
+            </a:r>
+            <a:endParaRPr lang="pt-BR" dirty="0"/>
+          </a:p>
+          <a:p>
+            <a:pPr marL="0" indent="0">
+              <a:lnSpc>
+                <a:spcPct val="120000"/>
+              </a:lnSpc>
+              <a:spcBef>
+                <a:spcPts val="0"/>
+              </a:spcBef>
+              <a:buNone/>
+            </a:pPr>
+            <a:r>
+              <a:rPr lang="pt-BR" dirty="0"/>
+              <a:t>  FOR EACH ROW</a:t>
+            </a:r>
+          </a:p>
+          <a:p>
+            <a:pPr marL="0" indent="0">
+              <a:lnSpc>
+                <a:spcPct val="120000"/>
+              </a:lnSpc>
+              <a:spcBef>
+                <a:spcPts val="0"/>
+              </a:spcBef>
+              <a:buNone/>
+            </a:pPr>
+            <a:r>
+              <a:rPr lang="pt-BR" dirty="0"/>
+              <a:t>    </a:t>
+            </a:r>
+          </a:p>
+          <a:p>
+            <a:pPr marL="0" indent="0">
+              <a:lnSpc>
+                <a:spcPct val="120000"/>
+              </a:lnSpc>
+              <a:spcBef>
+                <a:spcPts val="0"/>
+              </a:spcBef>
+              <a:buNone/>
+            </a:pPr>
+            <a:r>
+              <a:rPr lang="pt-BR" dirty="0"/>
+              <a:t>BEGIN</a:t>
+            </a:r>
+          </a:p>
+          <a:p>
+            <a:pPr marL="0" indent="0">
+              <a:lnSpc>
+                <a:spcPct val="120000"/>
+              </a:lnSpc>
+              <a:spcBef>
+                <a:spcPts val="0"/>
+              </a:spcBef>
+              <a:buNone/>
+            </a:pPr>
+            <a:r>
+              <a:rPr lang="pt-BR" dirty="0"/>
+              <a:t>    </a:t>
+            </a:r>
+            <a:r>
+              <a:rPr lang="pt-BR" dirty="0" err="1"/>
+              <a:t>add_job_history</a:t>
+            </a:r>
+            <a:r>
+              <a:rPr lang="pt-BR" dirty="0"/>
+              <a:t>(:</a:t>
+            </a:r>
+            <a:r>
+              <a:rPr lang="pt-BR" dirty="0" err="1"/>
+              <a:t>old.employee_id</a:t>
+            </a:r>
+            <a:r>
+              <a:rPr lang="pt-BR" dirty="0"/>
+              <a:t>, :</a:t>
+            </a:r>
+            <a:r>
+              <a:rPr lang="pt-BR" dirty="0" err="1"/>
+              <a:t>old.hire_date</a:t>
+            </a:r>
+            <a:r>
+              <a:rPr lang="pt-BR" dirty="0"/>
+              <a:t>, </a:t>
+            </a:r>
+            <a:r>
+              <a:rPr lang="pt-BR" dirty="0" err="1"/>
+              <a:t>sysdate</a:t>
+            </a:r>
+            <a:r>
+              <a:rPr lang="pt-BR" dirty="0"/>
+              <a:t>,</a:t>
+            </a:r>
+          </a:p>
+          <a:p>
+            <a:pPr marL="0" indent="0">
+              <a:lnSpc>
+                <a:spcPct val="120000"/>
+              </a:lnSpc>
+              <a:spcBef>
+                <a:spcPts val="0"/>
+              </a:spcBef>
+              <a:buNone/>
+            </a:pPr>
+            <a:r>
+              <a:rPr lang="pt-BR" dirty="0"/>
+              <a:t>                  :</a:t>
+            </a:r>
+            <a:r>
+              <a:rPr lang="pt-BR" dirty="0" err="1"/>
+              <a:t>old.job_id</a:t>
+            </a:r>
+            <a:r>
+              <a:rPr lang="pt-BR" dirty="0"/>
+              <a:t>, :</a:t>
+            </a:r>
+            <a:r>
+              <a:rPr lang="pt-BR" dirty="0" err="1"/>
+              <a:t>new.job_id</a:t>
+            </a:r>
+            <a:r>
+              <a:rPr lang="pt-BR" dirty="0"/>
+              <a:t>, :</a:t>
+            </a:r>
+            <a:r>
+              <a:rPr lang="pt-BR" dirty="0" err="1"/>
+              <a:t>old.department_id</a:t>
+            </a:r>
+            <a:r>
+              <a:rPr lang="pt-BR" dirty="0"/>
+              <a:t>, </a:t>
+            </a:r>
+          </a:p>
+          <a:p>
+            <a:pPr marL="0" indent="0">
+              <a:lnSpc>
+                <a:spcPct val="120000"/>
+              </a:lnSpc>
+              <a:spcBef>
+                <a:spcPts val="0"/>
+              </a:spcBef>
+              <a:buNone/>
+            </a:pPr>
+            <a:r>
+              <a:rPr lang="pt-BR" dirty="0"/>
+              <a:t>                  :</a:t>
+            </a:r>
+            <a:r>
+              <a:rPr lang="pt-BR" dirty="0" err="1"/>
+              <a:t>new.department_id</a:t>
+            </a:r>
+            <a:r>
+              <a:rPr lang="pt-BR" dirty="0"/>
+              <a:t>, :</a:t>
+            </a:r>
+            <a:r>
+              <a:rPr lang="pt-BR" dirty="0" err="1"/>
+              <a:t>new.salary</a:t>
+            </a:r>
+            <a:r>
+              <a:rPr lang="pt-BR" dirty="0"/>
+              <a:t>, :</a:t>
+            </a:r>
+            <a:r>
+              <a:rPr lang="pt-BR" dirty="0" err="1"/>
+              <a:t>old.salary</a:t>
+            </a:r>
+            <a:r>
+              <a:rPr lang="pt-BR" dirty="0"/>
+              <a:t>);</a:t>
+            </a:r>
+          </a:p>
+          <a:p>
+            <a:pPr marL="0" indent="0">
+              <a:lnSpc>
+                <a:spcPct val="120000"/>
+              </a:lnSpc>
+              <a:spcBef>
+                <a:spcPts val="0"/>
+              </a:spcBef>
+              <a:buNone/>
+            </a:pPr>
+            <a:r>
+              <a:rPr lang="pt-BR" dirty="0"/>
+              <a:t>    </a:t>
+            </a:r>
+          </a:p>
+          <a:p>
+            <a:pPr marL="0" indent="0">
+              <a:lnSpc>
+                <a:spcPct val="120000"/>
+              </a:lnSpc>
+              <a:spcBef>
+                <a:spcPts val="0"/>
+              </a:spcBef>
+              <a:buNone/>
+            </a:pPr>
+            <a:r>
+              <a:rPr lang="pt-BR" dirty="0"/>
+              <a:t>    DBMS_OUTPUT.PUT_LINE('Aumento foi de: R$'|| </a:t>
+            </a:r>
+            <a:r>
+              <a:rPr lang="pt-BR" dirty="0" err="1"/>
+              <a:t>to_char</a:t>
+            </a:r>
+            <a:r>
+              <a:rPr lang="pt-BR" dirty="0"/>
+              <a:t>(:</a:t>
+            </a:r>
+            <a:r>
+              <a:rPr lang="pt-BR" dirty="0" err="1"/>
+              <a:t>new.salary</a:t>
+            </a:r>
+            <a:r>
+              <a:rPr lang="pt-BR" dirty="0"/>
+              <a:t> - :</a:t>
+            </a:r>
+            <a:r>
+              <a:rPr lang="pt-BR" dirty="0" err="1"/>
+              <a:t>old.salary</a:t>
+            </a:r>
+            <a:r>
+              <a:rPr lang="pt-BR" dirty="0"/>
+              <a:t>));</a:t>
+            </a:r>
+          </a:p>
+          <a:p>
+            <a:pPr marL="0" indent="0">
+              <a:lnSpc>
+                <a:spcPct val="120000"/>
+              </a:lnSpc>
+              <a:spcBef>
+                <a:spcPts val="0"/>
+              </a:spcBef>
+              <a:buNone/>
+            </a:pPr>
+            <a:r>
+              <a:rPr lang="pt-BR" dirty="0"/>
+              <a:t>END;</a:t>
+            </a:r>
+          </a:p>
+        </p:txBody>
+      </p:sp>
+    </p:spTree>
+    <p:extLst>
+      <p:ext uri="{BB962C8B-B14F-4D97-AF65-F5344CB8AC3E}">
+        <p14:creationId xmlns:p14="http://schemas.microsoft.com/office/powerpoint/2010/main" val="1015535448"/>
+      </p:ext>
+    </p:extLst>
+  </p:cSld>
+  <p:clrMapOvr>
+    <a:masterClrMapping/>
+  </p:clrMapOvr>
   <mc:AlternateContent xmlns:mc="http://schemas.openxmlformats.org/markup-compatibility/2006">
     <mc:Choice xmlns:p14="http://schemas.microsoft.com/office/powerpoint/2010/main" Requires="p14">
       <p:transition spd="med" p14:dur="700">
@@ -5028,7 +6308,7 @@
 </p:sld>
 </file>
 
-<file path=ppt/slides/slide11.xml><?xml version="1.0" encoding="utf-8"?>
+<file path=ppt/slides/slide13.xml><?xml version="1.0" encoding="utf-8"?>
 <p:sld xmlns:a="http://schemas.openxmlformats.org/drawingml/2006/main" xmlns:r="http://schemas.openxmlformats.org/officeDocument/2006/relationships" xmlns:p="http://schemas.openxmlformats.org/presentationml/2006/main">
   <p:cSld>
     <p:spTree>
@@ -6517,13 +7797,13 @@
   <p:clrMapOvr>
     <a:masterClrMapping/>
   </p:clrMapOvr>
-  <mc:AlternateContent xmlns:mc="http://schemas.openxmlformats.org/markup-compatibility/2006">
-    <mc:Choice xmlns:p14="http://schemas.microsoft.com/office/powerpoint/2010/main" Requires="p14">
+  <mc:AlternateContent xmlns:mc="http://schemas.openxmlformats.org/markup-compatibility/2006" xmlns:p14="http://schemas.microsoft.com/office/powerpoint/2010/main">
+    <mc:Choice Requires="p14">
       <p:transition spd="med" p14:dur="700">
         <p:fade/>
       </p:transition>
     </mc:Choice>
-    <mc:Fallback>
+    <mc:Fallback xmlns="">
       <p:transition spd="med">
         <p:fade/>
       </p:transition>
@@ -8941,6 +10221,15 @@
 </file>
 
 <file path=customXml/item2.xml><?xml version="1.0" encoding="utf-8"?>
+<?mso-contentType ?>
+<FormTemplates xmlns="http://schemas.microsoft.com/sharepoint/v3/contenttype/forms">
+  <Display>DocumentLibraryForm</Display>
+  <Edit>AssetEditForm</Edit>
+  <New>DocumentLibraryForm</New>
+</FormTemplates>
+</file>
+
+<file path=customXml/item3.xml><?xml version="1.0" encoding="utf-8"?>
 <p:properties xmlns:p="http://schemas.microsoft.com/office/2006/metadata/properties" xmlns:xsi="http://www.w3.org/2001/XMLSchema-instance" xmlns:pc="http://schemas.microsoft.com/office/infopath/2007/PartnerControls">
   <documentManagement>
     <DirectSourceMarket xmlns="4873beb7-5857-4685-be1f-d57550cc96cc" xsi:nil="true"/>
@@ -9066,15 +10355,6 @@
 </p:properties>
 </file>
 
-<file path=customXml/item3.xml><?xml version="1.0" encoding="utf-8"?>
-<?mso-contentType ?>
-<FormTemplates xmlns="http://schemas.microsoft.com/sharepoint/v3/contenttype/forms">
-  <Display>DocumentLibraryForm</Display>
-  <Edit>AssetEditForm</Edit>
-  <New>DocumentLibraryForm</New>
-</FormTemplates>
-</file>
-
 <file path=customXml/itemProps1.xml><?xml version="1.0" encoding="utf-8"?>
 <ds:datastoreItem xmlns:ds="http://schemas.openxmlformats.org/officeDocument/2006/customXml" ds:itemID="{83ED4759-CFDD-43F0-817C-11D9197192BA}">
   <ds:schemaRefs>
@@ -9094,25 +10374,25 @@
 </file>
 
 <file path=customXml/itemProps2.xml><?xml version="1.0" encoding="utf-8"?>
-<ds:datastoreItem xmlns:ds="http://schemas.openxmlformats.org/officeDocument/2006/customXml" ds:itemID="{4ED80E12-3BE9-4746-820E-FFB249F467F2}">
+<ds:datastoreItem xmlns:ds="http://schemas.openxmlformats.org/officeDocument/2006/customXml" ds:itemID="{8D003AC8-209A-4321-A17C-1B7A20643390}">
   <ds:schemaRefs>
-    <ds:schemaRef ds:uri="http://schemas.openxmlformats.org/package/2006/metadata/core-properties"/>
-    <ds:schemaRef ds:uri="http://purl.org/dc/elements/1.1/"/>
-    <ds:schemaRef ds:uri="http://purl.org/dc/terms/"/>
-    <ds:schemaRef ds:uri="http://schemas.microsoft.com/office/2006/metadata/properties"/>
-    <ds:schemaRef ds:uri="http://purl.org/dc/dcmitype/"/>
-    <ds:schemaRef ds:uri="http://schemas.microsoft.com/office/2006/documentManagement/types"/>
-    <ds:schemaRef ds:uri="http://schemas.microsoft.com/office/infopath/2007/PartnerControls"/>
-    <ds:schemaRef ds:uri="4873beb7-5857-4685-be1f-d57550cc96cc"/>
-    <ds:schemaRef ds:uri="http://www.w3.org/XML/1998/namespace"/>
+    <ds:schemaRef ds:uri="http://schemas.microsoft.com/sharepoint/v3/contenttype/forms"/>
   </ds:schemaRefs>
 </ds:datastoreItem>
 </file>
 
 <file path=customXml/itemProps3.xml><?xml version="1.0" encoding="utf-8"?>
-<ds:datastoreItem xmlns:ds="http://schemas.openxmlformats.org/officeDocument/2006/customXml" ds:itemID="{8D003AC8-209A-4321-A17C-1B7A20643390}">
+<ds:datastoreItem xmlns:ds="http://schemas.openxmlformats.org/officeDocument/2006/customXml" ds:itemID="{4ED80E12-3BE9-4746-820E-FFB249F467F2}">
   <ds:schemaRefs>
-    <ds:schemaRef ds:uri="http://schemas.microsoft.com/sharepoint/v3/contenttype/forms"/>
+    <ds:schemaRef ds:uri="http://schemas.microsoft.com/office/2006/documentManagement/types"/>
+    <ds:schemaRef ds:uri="http://purl.org/dc/terms/"/>
+    <ds:schemaRef ds:uri="4873beb7-5857-4685-be1f-d57550cc96cc"/>
+    <ds:schemaRef ds:uri="http://www.w3.org/XML/1998/namespace"/>
+    <ds:schemaRef ds:uri="http://purl.org/dc/elements/1.1/"/>
+    <ds:schemaRef ds:uri="http://schemas.openxmlformats.org/package/2006/metadata/core-properties"/>
+    <ds:schemaRef ds:uri="http://schemas.microsoft.com/office/infopath/2007/PartnerControls"/>
+    <ds:schemaRef ds:uri="http://schemas.microsoft.com/office/2006/metadata/properties"/>
+    <ds:schemaRef ds:uri="http://purl.org/dc/dcmitype/"/>
   </ds:schemaRefs>
 </ds:datastoreItem>
 </file>
</xml_diff>